<commit_message>
typo in a diagram
</commit_message>
<xml_diff>
--- a/images/multiple-document-formats.pptx
+++ b/images/multiple-document-formats.pptx
@@ -197,7 +197,7 @@
           <a:p>
             <a:fld id="{29AEB4E5-5D46-4255-A47C-CDEF87975DC7}" type="datetimeFigureOut">
               <a:rPr lang="en-US" smtClean="0"/>
-              <a:t>2/18/2021</a:t>
+              <a:t>3/12/2021</a:t>
             </a:fld>
             <a:endParaRPr lang="en-US"/>
           </a:p>
@@ -695,7 +695,7 @@
           <a:p>
             <a:fld id="{BAD0FFBF-4E99-45CB-A7A6-1786019EBE52}" type="datetimeFigureOut">
               <a:rPr lang="en-US" smtClean="0"/>
-              <a:t>2/18/2021</a:t>
+              <a:t>3/12/2021</a:t>
             </a:fld>
             <a:endParaRPr lang="en-US"/>
           </a:p>
@@ -893,7 +893,7 @@
           <a:p>
             <a:fld id="{BAD0FFBF-4E99-45CB-A7A6-1786019EBE52}" type="datetimeFigureOut">
               <a:rPr lang="en-US" smtClean="0"/>
-              <a:t>2/18/2021</a:t>
+              <a:t>3/12/2021</a:t>
             </a:fld>
             <a:endParaRPr lang="en-US"/>
           </a:p>
@@ -1101,7 +1101,7 @@
           <a:p>
             <a:fld id="{BAD0FFBF-4E99-45CB-A7A6-1786019EBE52}" type="datetimeFigureOut">
               <a:rPr lang="en-US" smtClean="0"/>
-              <a:t>2/18/2021</a:t>
+              <a:t>3/12/2021</a:t>
             </a:fld>
             <a:endParaRPr lang="en-US"/>
           </a:p>
@@ -1299,7 +1299,7 @@
           <a:p>
             <a:fld id="{BAD0FFBF-4E99-45CB-A7A6-1786019EBE52}" type="datetimeFigureOut">
               <a:rPr lang="en-US" smtClean="0"/>
-              <a:t>2/18/2021</a:t>
+              <a:t>3/12/2021</a:t>
             </a:fld>
             <a:endParaRPr lang="en-US"/>
           </a:p>
@@ -1574,7 +1574,7 @@
           <a:p>
             <a:fld id="{BAD0FFBF-4E99-45CB-A7A6-1786019EBE52}" type="datetimeFigureOut">
               <a:rPr lang="en-US" smtClean="0"/>
-              <a:t>2/18/2021</a:t>
+              <a:t>3/12/2021</a:t>
             </a:fld>
             <a:endParaRPr lang="en-US"/>
           </a:p>
@@ -1839,7 +1839,7 @@
           <a:p>
             <a:fld id="{BAD0FFBF-4E99-45CB-A7A6-1786019EBE52}" type="datetimeFigureOut">
               <a:rPr lang="en-US" smtClean="0"/>
-              <a:t>2/18/2021</a:t>
+              <a:t>3/12/2021</a:t>
             </a:fld>
             <a:endParaRPr lang="en-US"/>
           </a:p>
@@ -2251,7 +2251,7 @@
           <a:p>
             <a:fld id="{BAD0FFBF-4E99-45CB-A7A6-1786019EBE52}" type="datetimeFigureOut">
               <a:rPr lang="en-US" smtClean="0"/>
-              <a:t>2/18/2021</a:t>
+              <a:t>3/12/2021</a:t>
             </a:fld>
             <a:endParaRPr lang="en-US"/>
           </a:p>
@@ -2392,7 +2392,7 @@
           <a:p>
             <a:fld id="{BAD0FFBF-4E99-45CB-A7A6-1786019EBE52}" type="datetimeFigureOut">
               <a:rPr lang="en-US" smtClean="0"/>
-              <a:t>2/18/2021</a:t>
+              <a:t>3/12/2021</a:t>
             </a:fld>
             <a:endParaRPr lang="en-US"/>
           </a:p>
@@ -2505,7 +2505,7 @@
           <a:p>
             <a:fld id="{BAD0FFBF-4E99-45CB-A7A6-1786019EBE52}" type="datetimeFigureOut">
               <a:rPr lang="en-US" smtClean="0"/>
-              <a:t>2/18/2021</a:t>
+              <a:t>3/12/2021</a:t>
             </a:fld>
             <a:endParaRPr lang="en-US"/>
           </a:p>
@@ -2816,7 +2816,7 @@
           <a:p>
             <a:fld id="{BAD0FFBF-4E99-45CB-A7A6-1786019EBE52}" type="datetimeFigureOut">
               <a:rPr lang="en-US" smtClean="0"/>
-              <a:t>2/18/2021</a:t>
+              <a:t>3/12/2021</a:t>
             </a:fld>
             <a:endParaRPr lang="en-US"/>
           </a:p>
@@ -3104,7 +3104,7 @@
           <a:p>
             <a:fld id="{BAD0FFBF-4E99-45CB-A7A6-1786019EBE52}" type="datetimeFigureOut">
               <a:rPr lang="en-US" smtClean="0"/>
-              <a:t>2/18/2021</a:t>
+              <a:t>3/12/2021</a:t>
             </a:fld>
             <a:endParaRPr lang="en-US"/>
           </a:p>
@@ -3345,7 +3345,7 @@
           <a:p>
             <a:fld id="{BAD0FFBF-4E99-45CB-A7A6-1786019EBE52}" type="datetimeFigureOut">
               <a:rPr lang="en-US" smtClean="0"/>
-              <a:t>2/18/2021</a:t>
+              <a:t>3/12/2021</a:t>
             </a:fld>
             <a:endParaRPr lang="en-US"/>
           </a:p>
@@ -4647,40 +4647,6 @@
           </a:prstGeom>
         </p:spPr>
       </p:pic>
-      <p:sp>
-        <p:nvSpPr>
-          <p:cNvPr id="74" name="TextBox 73"/>
-          <p:cNvSpPr txBox="1"/>
-          <p:nvPr/>
-        </p:nvSpPr>
-        <p:spPr>
-          <a:xfrm>
-            <a:off x="1641682" y="482776"/>
-            <a:ext cx="1811340" cy="843529"/>
-          </a:xfrm>
-          <a:prstGeom prst="rect">
-            <a:avLst/>
-          </a:prstGeom>
-          <a:noFill/>
-        </p:spPr>
-        <p:txBody>
-          <a:bodyPr wrap="square" rtlCol="0">
-            <a:spAutoFit/>
-          </a:bodyPr>
-          <a:lstStyle/>
-          <a:p>
-            <a:pPr algn="ctr"/>
-            <a:r>
-              <a:rPr lang="en-US" b="1" dirty="0">
-                <a:solidFill>
-                  <a:schemeClr val="bg1"/>
-                </a:solidFill>
-              </a:rPr>
-              <a:t>Document Consumer</a:t>
-            </a:r>
-          </a:p>
-        </p:txBody>
-      </p:sp>
       <p:sp>
         <p:nvSpPr>
           <p:cNvPr id="75" name="TextBox 74"/>

</xml_diff>